<commit_message>
add github link in slides
</commit_message>
<xml_diff>
--- a/multistate_local_minima.pptx
+++ b/multistate_local_minima.pptx
@@ -5565,6 +5565,38 @@
               <a:rPr lang="fr-FR" dirty="0" smtClean="0"/>
               <a:t>: </a:t>
             </a:r>
+            <a:endParaRPr lang="fr-FR" dirty="0" smtClean="0"/>
+          </a:p>
+          <a:p>
+            <a:pPr marL="400050" lvl="1" indent="0">
+              <a:buNone/>
+            </a:pPr>
+            <a:r>
+              <a:rPr lang="fr-FR" dirty="0" smtClean="0"/>
+              <a:t>https</a:t>
+            </a:r>
+            <a:r>
+              <a:rPr lang="fr-FR" dirty="0"/>
+              <a:t>://github.com/</a:t>
+            </a:r>
+            <a:r>
+              <a:rPr lang="fr-FR" dirty="0" smtClean="0"/>
+              <a:t>oliviergimenez</a:t>
+            </a:r>
+            <a:r>
+              <a:rPr lang="fr-FR" dirty="0"/>
+              <a:t>/</a:t>
+            </a:r>
+            <a:r>
+              <a:rPr lang="fr-FR" dirty="0" smtClean="0"/>
+              <a:t>multistate_local_minima</a:t>
+            </a:r>
+          </a:p>
+          <a:p>
+            <a:pPr marL="0" indent="0">
+              <a:buNone/>
+            </a:pPr>
+            <a:endParaRPr lang="fr-FR" dirty="0" smtClean="0"/>
           </a:p>
         </p:txBody>
       </p:sp>

</xml_diff>